<commit_message>
Final de la clase 1
</commit_message>
<xml_diff>
--- a/Clase 1/Clase 1.pptx
+++ b/Clase 1/Clase 1.pptx
@@ -5,7 +5,7 @@
     <p:sldMasterId id="2147483660" r:id="rId1"/>
   </p:sldMasterIdLst>
   <p:notesMasterIdLst>
-    <p:notesMasterId r:id="rId39"/>
+    <p:notesMasterId r:id="rId40"/>
   </p:notesMasterIdLst>
   <p:sldIdLst>
     <p:sldId id="256" r:id="rId2"/>
@@ -45,6 +45,7 @@
     <p:sldId id="280" r:id="rId36"/>
     <p:sldId id="281" r:id="rId37"/>
     <p:sldId id="297" r:id="rId38"/>
+    <p:sldId id="299" r:id="rId39"/>
   </p:sldIdLst>
   <p:sldSz cx="9144000" cy="5143500" type="screen16x9"/>
   <p:notesSz cx="6858000" cy="9144000"/>
@@ -10343,6 +10344,13 @@
   <p:clrMapOvr>
     <a:masterClrMapping/>
   </p:clrMapOvr>
+  <p:timing>
+    <p:tnLst>
+      <p:par>
+        <p:cTn id="1" dur="indefinite" restart="never" nodeType="tmRoot"/>
+      </p:par>
+    </p:tnLst>
+  </p:timing>
 </p:sld>
 </file>
 
@@ -16616,6 +16624,13 @@
   <p:clrMapOvr>
     <a:masterClrMapping/>
   </p:clrMapOvr>
+  <p:timing>
+    <p:tnLst>
+      <p:par>
+        <p:cTn id="1" dur="indefinite" restart="never" nodeType="tmRoot"/>
+      </p:par>
+    </p:tnLst>
+  </p:timing>
 </p:sld>
 </file>
 
@@ -20391,6 +20406,77 @@
 </p:sld>
 </file>
 
+<file path=ppt/slides/slide38.xml><?xml version="1.0" encoding="utf-8"?>
+<p:sld xmlns:a="http://schemas.openxmlformats.org/drawingml/2006/main" xmlns:r="http://schemas.openxmlformats.org/officeDocument/2006/relationships" xmlns:p="http://schemas.openxmlformats.org/presentationml/2006/main">
+  <p:cSld>
+    <p:spTree>
+      <p:nvGrpSpPr>
+        <p:cNvPr id="1" name=""/>
+        <p:cNvGrpSpPr/>
+        <p:nvPr/>
+      </p:nvGrpSpPr>
+      <p:grpSpPr>
+        <a:xfrm>
+          <a:off x="0" y="0"/>
+          <a:ext cx="0" cy="0"/>
+          <a:chOff x="0" y="0"/>
+          <a:chExt cx="0" cy="0"/>
+        </a:xfrm>
+      </p:grpSpPr>
+      <p:sp>
+        <p:nvSpPr>
+          <p:cNvPr id="2" name="Título 1"/>
+          <p:cNvSpPr>
+            <a:spLocks noGrp="1"/>
+          </p:cNvSpPr>
+          <p:nvPr>
+            <p:ph type="title"/>
+          </p:nvPr>
+        </p:nvSpPr>
+        <p:spPr/>
+        <p:txBody>
+          <a:bodyPr/>
+          <a:lstStyle/>
+          <a:p>
+            <a:endParaRPr lang="es-CO"/>
+          </a:p>
+        </p:txBody>
+      </p:sp>
+      <p:sp>
+        <p:nvSpPr>
+          <p:cNvPr id="3" name="Marcador de contenido 2"/>
+          <p:cNvSpPr>
+            <a:spLocks noGrp="1"/>
+          </p:cNvSpPr>
+          <p:nvPr>
+            <p:ph idx="1"/>
+          </p:nvPr>
+        </p:nvSpPr>
+        <p:spPr/>
+        <p:txBody>
+          <a:bodyPr/>
+          <a:lstStyle/>
+          <a:p>
+            <a:r>
+              <a:rPr lang="es-CO" dirty="0"/>
+              <a:t>https://github.com/Domiciano/AppMoviles191</a:t>
+            </a:r>
+          </a:p>
+        </p:txBody>
+      </p:sp>
+    </p:spTree>
+    <p:extLst>
+      <p:ext uri="{BB962C8B-B14F-4D97-AF65-F5344CB8AC3E}">
+        <p14:creationId xmlns:p14="http://schemas.microsoft.com/office/powerpoint/2010/main" val="771918813"/>
+      </p:ext>
+    </p:extLst>
+  </p:cSld>
+  <p:clrMapOvr>
+    <a:masterClrMapping/>
+  </p:clrMapOvr>
+</p:sld>
+</file>
+
 <file path=ppt/slides/slide4.xml><?xml version="1.0" encoding="utf-8"?>
 <p:sld xmlns:a="http://schemas.openxmlformats.org/drawingml/2006/main" xmlns:r="http://schemas.openxmlformats.org/officeDocument/2006/relationships" xmlns:p="http://schemas.openxmlformats.org/presentationml/2006/main">
   <p:cSld>
@@ -20737,6 +20823,13 @@
   <p:clrMapOvr>
     <a:masterClrMapping/>
   </p:clrMapOvr>
+  <p:timing>
+    <p:tnLst>
+      <p:par>
+        <p:cTn id="1" dur="indefinite" restart="never" nodeType="tmRoot"/>
+      </p:par>
+    </p:tnLst>
+  </p:timing>
 </p:sld>
 </file>
 
@@ -21074,6 +21167,13 @@
   <p:clrMapOvr>
     <a:masterClrMapping/>
   </p:clrMapOvr>
+  <p:timing>
+    <p:tnLst>
+      <p:par>
+        <p:cTn id="1" dur="indefinite" restart="never" nodeType="tmRoot"/>
+      </p:par>
+    </p:tnLst>
+  </p:timing>
 </p:sld>
 </file>
 
@@ -21411,6 +21511,13 @@
   <p:clrMapOvr>
     <a:masterClrMapping/>
   </p:clrMapOvr>
+  <p:timing>
+    <p:tnLst>
+      <p:par>
+        <p:cTn id="1" dur="indefinite" restart="never" nodeType="tmRoot"/>
+      </p:par>
+    </p:tnLst>
+  </p:timing>
 </p:sld>
 </file>
 
@@ -21687,6 +21794,13 @@
   <p:clrMapOvr>
     <a:masterClrMapping/>
   </p:clrMapOvr>
+  <p:timing>
+    <p:tnLst>
+      <p:par>
+        <p:cTn id="1" dur="indefinite" restart="never" nodeType="tmRoot"/>
+      </p:par>
+    </p:tnLst>
+  </p:timing>
 </p:sld>
 </file>
 

</xml_diff>